<commit_message>
Updated python conclusion slides
</commit_message>
<xml_diff>
--- a/python/presentations/learning_python/python_conclusion.pptx
+++ b/python/presentations/learning_python/python_conclusion.pptx
@@ -694,7 +694,7 @@
               <a:pPr>
                 <a:defRPr/>
               </a:pPr>
-              <a:t>24/11/2021</a:t>
+              <a:t>26/11/2021</a:t>
             </a:fld>
             <a:endParaRPr lang="en-GB"/>
           </a:p>
@@ -931,7 +931,7 @@
               <a:pPr>
                 <a:defRPr/>
               </a:pPr>
-              <a:t>24/11/2021</a:t>
+              <a:t>26/11/2021</a:t>
             </a:fld>
             <a:endParaRPr lang="en-GB"/>
           </a:p>
@@ -1652,7 +1652,7 @@
               <a:pPr>
                 <a:defRPr/>
               </a:pPr>
-              <a:t>24/11/2021</a:t>
+              <a:t>26/11/2021</a:t>
             </a:fld>
             <a:endParaRPr lang="en-GB"/>
           </a:p>
@@ -1789,7 +1789,7 @@
               <a:pPr>
                 <a:defRPr/>
               </a:pPr>
-              <a:t>24/11/2021</a:t>
+              <a:t>26/11/2021</a:t>
             </a:fld>
             <a:endParaRPr lang="en-GB"/>
           </a:p>
@@ -3558,8 +3558,6 @@
               <a:lnSpc>
                 <a:spcPct val="125000"/>
               </a:lnSpc>
-              <a:buFont typeface="Arial" pitchFamily="34" charset="0"/>
-              <a:buChar char="•"/>
               <a:tabLst>
                 <a:tab pos="655638" algn="l"/>
                 <a:tab pos="1312863" algn="l"/>
@@ -3580,7 +3578,7 @@
                 <a:latin typeface="+mn-lt"/>
                 <a:cs typeface="Arial" charset="0"/>
               </a:rPr>
-              <a:t> Full version of the modules and exercises/solutions:</a:t>
+              <a:t>Full version of the modules and exercises/solutions:</a:t>
             </a:r>
           </a:p>
           <a:p>
@@ -6337,6 +6335,73 @@
           </a:prstGeom>
         </p:spPr>
       </p:pic>
+      <p:sp>
+        <p:nvSpPr>
+          <p:cNvPr id="5" name="Rectangle: Rounded Corners 4">
+            <a:extLst>
+              <a:ext uri="{FF2B5EF4-FFF2-40B4-BE49-F238E27FC236}">
+                <a16:creationId xmlns:a16="http://schemas.microsoft.com/office/drawing/2014/main" id="{E243D9B8-6074-48BC-9622-C4DB590B9E2C}"/>
+              </a:ext>
+            </a:extLst>
+          </p:cNvPr>
+          <p:cNvSpPr/>
+          <p:nvPr/>
+        </p:nvSpPr>
+        <p:spPr>
+          <a:xfrm>
+            <a:off x="179512" y="5114045"/>
+            <a:ext cx="5059858" cy="1224136"/>
+          </a:xfrm>
+          <a:prstGeom prst="roundRect">
+            <a:avLst/>
+          </a:prstGeom>
+          <a:effectLst>
+            <a:outerShdw blurRad="50800" dist="38100" dir="2700000" algn="tl" rotWithShape="0">
+              <a:prstClr val="black">
+                <a:alpha val="40000"/>
+              </a:prstClr>
+            </a:outerShdw>
+          </a:effectLst>
+        </p:spPr>
+        <p:style>
+          <a:lnRef idx="2">
+            <a:schemeClr val="accent6"/>
+          </a:lnRef>
+          <a:fillRef idx="1">
+            <a:schemeClr val="lt1"/>
+          </a:fillRef>
+          <a:effectRef idx="0">
+            <a:schemeClr val="accent6"/>
+          </a:effectRef>
+          <a:fontRef idx="minor">
+            <a:schemeClr val="dk1"/>
+          </a:fontRef>
+        </p:style>
+        <p:txBody>
+          <a:bodyPr rtlCol="0" anchor="ctr"/>
+          <a:lstStyle/>
+          <a:p>
+            <a:pPr algn="ctr"/>
+            <a:r>
+              <a:rPr lang="en-GB" sz="2000" dirty="0"/>
+              <a:t>Look out for the next NCAS course:</a:t>
+            </a:r>
+          </a:p>
+          <a:p>
+            <a:pPr algn="ctr"/>
+            <a:r>
+              <a:rPr lang="en-GB" sz="2000" dirty="0">
+                <a:hlinkClick r:id="rId5"/>
+              </a:rPr>
+              <a:t>https://ncas.ac.uk/study-with-us/data-analysis-tools/</a:t>
+            </a:r>
+            <a:r>
+              <a:rPr lang="en-GB" sz="2000" dirty="0"/>
+              <a:t> </a:t>
+            </a:r>
+          </a:p>
+        </p:txBody>
+      </p:sp>
     </p:spTree>
     <p:extLst>
       <p:ext uri="{BB962C8B-B14F-4D97-AF65-F5344CB8AC3E}">
@@ -6347,6 +6412,84 @@
   <p:clrMapOvr>
     <a:masterClrMapping/>
   </p:clrMapOvr>
+  <p:timing>
+    <p:tnLst>
+      <p:par>
+        <p:cTn id="1" dur="indefinite" restart="never" nodeType="tmRoot">
+          <p:childTnLst>
+            <p:seq concurrent="1" nextAc="seek">
+              <p:cTn id="2" dur="indefinite" nodeType="mainSeq">
+                <p:childTnLst>
+                  <p:par>
+                    <p:cTn id="3" fill="hold">
+                      <p:stCondLst>
+                        <p:cond delay="indefinite"/>
+                      </p:stCondLst>
+                      <p:childTnLst>
+                        <p:par>
+                          <p:cTn id="4" fill="hold">
+                            <p:stCondLst>
+                              <p:cond delay="0"/>
+                            </p:stCondLst>
+                            <p:childTnLst>
+                              <p:par>
+                                <p:cTn id="5" presetID="1" presetClass="entr" presetSubtype="0" fill="hold" grpId="0" nodeType="clickEffect">
+                                  <p:stCondLst>
+                                    <p:cond delay="0"/>
+                                  </p:stCondLst>
+                                  <p:childTnLst>
+                                    <p:set>
+                                      <p:cBhvr>
+                                        <p:cTn id="6" dur="1" fill="hold">
+                                          <p:stCondLst>
+                                            <p:cond delay="0"/>
+                                          </p:stCondLst>
+                                        </p:cTn>
+                                        <p:tgtEl>
+                                          <p:spTgt spid="5"/>
+                                        </p:tgtEl>
+                                        <p:attrNameLst>
+                                          <p:attrName>style.visibility</p:attrName>
+                                        </p:attrNameLst>
+                                      </p:cBhvr>
+                                      <p:to>
+                                        <p:strVal val="visible"/>
+                                      </p:to>
+                                    </p:set>
+                                  </p:childTnLst>
+                                </p:cTn>
+                              </p:par>
+                            </p:childTnLst>
+                          </p:cTn>
+                        </p:par>
+                      </p:childTnLst>
+                    </p:cTn>
+                  </p:par>
+                </p:childTnLst>
+              </p:cTn>
+              <p:prevCondLst>
+                <p:cond evt="onPrev" delay="0">
+                  <p:tgtEl>
+                    <p:sldTgt/>
+                  </p:tgtEl>
+                </p:cond>
+              </p:prevCondLst>
+              <p:nextCondLst>
+                <p:cond evt="onNext" delay="0">
+                  <p:tgtEl>
+                    <p:sldTgt/>
+                  </p:tgtEl>
+                </p:cond>
+              </p:nextCondLst>
+            </p:seq>
+          </p:childTnLst>
+        </p:cTn>
+      </p:par>
+    </p:tnLst>
+    <p:bldLst>
+      <p:bldP spid="5" grpId="0" animBg="1"/>
+    </p:bldLst>
+  </p:timing>
 </p:sld>
 </file>
 

</xml_diff>